<commit_message>
update presentation for java workshop :)
</commit_message>
<xml_diff>
--- a/FII.Practic.Tech.Levi9.March.2016.pptx
+++ b/FII.Practic.Tech.Levi9.March.2016.pptx
@@ -240,7 +240,7 @@
           <a:p>
             <a:fld id="{4BEF8651-3ED7-4908-89A0-BE7A233C7155}" type="datetimeFigureOut">
               <a:rPr lang="en-US" smtClean="0"/>
-              <a:t>3/11/2016</a:t>
+              <a:t>3/28/2016</a:t>
             </a:fld>
             <a:endParaRPr lang="en-US"/>
           </a:p>
@@ -3666,6 +3666,258 @@
     <p:extLst>
       <p:ext uri="{BB962C8B-B14F-4D97-AF65-F5344CB8AC3E}">
         <p14:creationId xmlns:p14="http://schemas.microsoft.com/office/powerpoint/2010/main" val="1092337580"/>
+      </p:ext>
+    </p:extLst>
+  </p:cSld>
+  <p:clrMapOvr>
+    <a:masterClrMapping/>
+  </p:clrMapOvr>
+</p:notes>
+</file>
+
+<file path=ppt/notesSlides/notesSlide14.xml><?xml version="1.0" encoding="utf-8"?>
+<p:notes xmlns:a="http://schemas.openxmlformats.org/drawingml/2006/main" xmlns:r="http://schemas.openxmlformats.org/officeDocument/2006/relationships" xmlns:p="http://schemas.openxmlformats.org/presentationml/2006/main">
+  <p:cSld>
+    <p:spTree>
+      <p:nvGrpSpPr>
+        <p:cNvPr id="1" name=""/>
+        <p:cNvGrpSpPr/>
+        <p:nvPr/>
+      </p:nvGrpSpPr>
+      <p:grpSpPr>
+        <a:xfrm>
+          <a:off x="0" y="0"/>
+          <a:ext cx="0" cy="0"/>
+          <a:chOff x="0" y="0"/>
+          <a:chExt cx="0" cy="0"/>
+        </a:xfrm>
+      </p:grpSpPr>
+      <p:sp>
+        <p:nvSpPr>
+          <p:cNvPr id="2" name="Slide Image Placeholder 1"/>
+          <p:cNvSpPr>
+            <a:spLocks noGrp="1" noRot="1" noChangeAspect="1"/>
+          </p:cNvSpPr>
+          <p:nvPr>
+            <p:ph type="sldImg"/>
+          </p:nvPr>
+        </p:nvSpPr>
+        <p:spPr/>
+      </p:sp>
+      <p:sp>
+        <p:nvSpPr>
+          <p:cNvPr id="3" name="Notes Placeholder 2"/>
+          <p:cNvSpPr>
+            <a:spLocks noGrp="1"/>
+          </p:cNvSpPr>
+          <p:nvPr>
+            <p:ph type="body" idx="1"/>
+          </p:nvPr>
+        </p:nvSpPr>
+        <p:spPr/>
+        <p:txBody>
+          <a:bodyPr/>
+          <a:lstStyle/>
+          <a:p>
+            <a:r>
+              <a:rPr lang="en-US" dirty="0" smtClean="0"/>
+              <a:t>Recap</a:t>
+            </a:r>
+            <a:endParaRPr lang="en-US" baseline="0" dirty="0" smtClean="0"/>
+          </a:p>
+          <a:p>
+            <a:pPr marL="171450" indent="-171450">
+              <a:buFontTx/>
+              <a:buChar char="-"/>
+            </a:pPr>
+            <a:r>
+              <a:rPr lang="en-US" baseline="0" dirty="0" smtClean="0"/>
+              <a:t>Web services:</a:t>
+            </a:r>
+          </a:p>
+          <a:p>
+            <a:pPr marL="628650" lvl="1" indent="-171450">
+              <a:buFontTx/>
+              <a:buChar char="-"/>
+            </a:pPr>
+            <a:r>
+              <a:rPr lang="en-US" baseline="0" dirty="0" smtClean="0"/>
+              <a:t>What are?</a:t>
+            </a:r>
+          </a:p>
+          <a:p>
+            <a:pPr marL="628650" lvl="1" indent="-171450">
+              <a:buFontTx/>
+              <a:buChar char="-"/>
+            </a:pPr>
+            <a:r>
+              <a:rPr lang="en-US" baseline="0" dirty="0" smtClean="0"/>
+              <a:t>Why use them?</a:t>
+            </a:r>
+          </a:p>
+          <a:p>
+            <a:pPr marL="628650" lvl="1" indent="-171450">
+              <a:buFontTx/>
+              <a:buChar char="-"/>
+            </a:pPr>
+            <a:r>
+              <a:rPr lang="en-US" baseline="0" dirty="0" smtClean="0"/>
+              <a:t>When to use them?</a:t>
+            </a:r>
+          </a:p>
+          <a:p>
+            <a:pPr marL="171450" lvl="0" indent="-171450">
+              <a:buFontTx/>
+              <a:buChar char="-"/>
+            </a:pPr>
+            <a:r>
+              <a:rPr lang="en-US" baseline="0" dirty="0" smtClean="0"/>
+              <a:t>Types of Web Services</a:t>
+            </a:r>
+          </a:p>
+          <a:p>
+            <a:pPr marL="628650" lvl="1" indent="-171450">
+              <a:buFontTx/>
+              <a:buChar char="-"/>
+            </a:pPr>
+            <a:r>
+              <a:rPr lang="en-US" baseline="0" dirty="0" smtClean="0"/>
+              <a:t>SOAP</a:t>
+            </a:r>
+          </a:p>
+          <a:p>
+            <a:pPr marL="628650" lvl="1" indent="-171450">
+              <a:buFontTx/>
+              <a:buChar char="-"/>
+            </a:pPr>
+            <a:r>
+              <a:rPr lang="en-US" baseline="0" dirty="0" smtClean="0"/>
+              <a:t>REST</a:t>
+            </a:r>
+          </a:p>
+          <a:p>
+            <a:pPr marL="171450" lvl="0" indent="-171450">
+              <a:buFontTx/>
+              <a:buChar char="-"/>
+            </a:pPr>
+            <a:r>
+              <a:rPr lang="en-US" baseline="0" dirty="0" smtClean="0"/>
+              <a:t>Richardson Maturity model</a:t>
+            </a:r>
+          </a:p>
+          <a:p>
+            <a:pPr marL="628650" lvl="1" indent="-171450">
+              <a:buFontTx/>
+              <a:buChar char="-"/>
+            </a:pPr>
+            <a:r>
+              <a:rPr lang="en-US" baseline="0" dirty="0" smtClean="0"/>
+              <a:t>Level 0 </a:t>
+            </a:r>
+            <a:r>
+              <a:rPr lang="en-US" baseline="0" dirty="0" smtClean="0"/>
+              <a:t>– </a:t>
+            </a:r>
+            <a:r>
+              <a:rPr lang="en-US" baseline="0" dirty="0" smtClean="0"/>
+              <a:t>swamp of POX (use HTTP as a tunnel, specify operations through XML)</a:t>
+            </a:r>
+          </a:p>
+          <a:p>
+            <a:pPr marL="628650" lvl="1" indent="-171450">
+              <a:buFontTx/>
+              <a:buChar char="-"/>
+            </a:pPr>
+            <a:r>
+              <a:rPr lang="en-US" baseline="0" dirty="0" smtClean="0"/>
+              <a:t>Level 1 </a:t>
+            </a:r>
+            <a:r>
+              <a:rPr lang="en-US" baseline="0" dirty="0" smtClean="0"/>
+              <a:t>–</a:t>
+            </a:r>
+            <a:r>
+              <a:rPr lang="en-US" baseline="0" dirty="0" smtClean="0"/>
+              <a:t> Introducing Resources (where is your web service functionality exposed for a given service)</a:t>
+            </a:r>
+          </a:p>
+          <a:p>
+            <a:pPr marL="628650" lvl="1" indent="-171450">
+              <a:buFontTx/>
+              <a:buChar char="-"/>
+            </a:pPr>
+            <a:r>
+              <a:rPr lang="en-US" baseline="0" dirty="0" smtClean="0"/>
+              <a:t>Level 2 – Introducing HTTP verbs that are easily mapped over CRUD</a:t>
+            </a:r>
+          </a:p>
+          <a:p>
+            <a:pPr marL="628650" lvl="1" indent="-171450">
+              <a:buFontTx/>
+              <a:buChar char="-"/>
+            </a:pPr>
+            <a:r>
+              <a:rPr lang="en-US" baseline="0" dirty="0" smtClean="0"/>
+              <a:t>Level 3 – HATEOAS (</a:t>
+            </a:r>
+            <a:r>
+              <a:rPr lang="en-US" sz="1200" b="0" i="0" kern="1200" dirty="0" smtClean="0">
+                <a:solidFill>
+                  <a:schemeClr val="tx1"/>
+                </a:solidFill>
+                <a:effectLst/>
+                <a:latin typeface="+mn-lt"/>
+                <a:ea typeface="+mn-ea"/>
+                <a:cs typeface="+mn-cs"/>
+              </a:rPr>
+              <a:t>Hypertext As The Engine Of Application State</a:t>
+            </a:r>
+            <a:r>
+              <a:rPr lang="en-US" baseline="0" dirty="0" smtClean="0"/>
+              <a:t>) – self describing web service </a:t>
+            </a:r>
+            <a:r>
+              <a:rPr lang="en-US" baseline="0" smtClean="0"/>
+              <a:t>(resource)</a:t>
+            </a:r>
+            <a:endParaRPr lang="en-US" baseline="0" dirty="0" smtClean="0"/>
+          </a:p>
+          <a:p>
+            <a:pPr marL="628650" lvl="1" indent="-171450">
+              <a:buFontTx/>
+              <a:buChar char="-"/>
+            </a:pPr>
+            <a:endParaRPr lang="en-US" baseline="0" dirty="0" smtClean="0"/>
+          </a:p>
+        </p:txBody>
+      </p:sp>
+      <p:sp>
+        <p:nvSpPr>
+          <p:cNvPr id="4" name="Slide Number Placeholder 3"/>
+          <p:cNvSpPr>
+            <a:spLocks noGrp="1"/>
+          </p:cNvSpPr>
+          <p:nvPr>
+            <p:ph type="sldNum" sz="quarter" idx="10"/>
+          </p:nvPr>
+        </p:nvSpPr>
+        <p:spPr/>
+        <p:txBody>
+          <a:bodyPr/>
+          <a:lstStyle/>
+          <a:p>
+            <a:fld id="{5C84FE02-A589-41E9-8DDF-29CEE6AB9026}" type="slidenum">
+              <a:rPr lang="en-US" smtClean="0"/>
+              <a:t>18</a:t>
+            </a:fld>
+            <a:endParaRPr lang="en-US"/>
+          </a:p>
+        </p:txBody>
+      </p:sp>
+    </p:spTree>
+    <p:extLst>
+      <p:ext uri="{BB962C8B-B14F-4D97-AF65-F5344CB8AC3E}">
+        <p14:creationId xmlns:p14="http://schemas.microsoft.com/office/powerpoint/2010/main" val="2068315187"/>
       </p:ext>
     </p:extLst>
   </p:cSld>
@@ -8623,7 +8875,7 @@
         <p:spPr>
           <a:xfrm>
             <a:off x="478971" y="2520674"/>
-            <a:ext cx="8363858" cy="2185214"/>
+            <a:ext cx="8363858" cy="1785104"/>
           </a:xfrm>
           <a:prstGeom prst="rect">
             <a:avLst/>
@@ -8680,25 +8932,27 @@
                 <a:latin typeface="Helvetica Neue Light"/>
                 <a:ea typeface="ヒラギノ明朝 ProN W3" pitchFamily="-84" charset="-128"/>
               </a:rPr>
-              <a:t>Richardson Maturity Model</a:t>
-            </a:r>
-          </a:p>
-          <a:p>
-            <a:pPr marL="342900" indent="-342900">
-              <a:buAutoNum type="arabicPeriod"/>
-            </a:pPr>
+              <a:t>Richardson Maturity </a:t>
+            </a:r>
             <a:r>
               <a:rPr lang="en-US" sz="2600" b="1" dirty="0" smtClean="0">
                 <a:solidFill>
-                  <a:schemeClr val="bg1">
-                    <a:lumMod val="75000"/>
-                  </a:schemeClr>
+                  <a:srgbClr val="424D43"/>
                 </a:solidFill>
                 <a:latin typeface="Helvetica Neue Light"/>
                 <a:ea typeface="ヒラギノ明朝 ProN W3" pitchFamily="-84" charset="-128"/>
               </a:rPr>
-              <a:t>Developing a REST application</a:t>
-            </a:r>
+              <a:t>Model</a:t>
+            </a:r>
+            <a:endParaRPr lang="en-US" sz="2600" b="1" dirty="0" smtClean="0">
+              <a:solidFill>
+                <a:schemeClr val="bg1">
+                  <a:lumMod val="75000"/>
+                </a:schemeClr>
+              </a:solidFill>
+              <a:latin typeface="Helvetica Neue Light"/>
+              <a:ea typeface="ヒラギノ明朝 ProN W3" pitchFamily="-84" charset="-128"/>
+            </a:endParaRPr>
           </a:p>
           <a:p>
             <a:pPr marL="342900" indent="-342900">
@@ -10031,7 +10285,7 @@
         <p:spPr>
           <a:xfrm>
             <a:off x="478971" y="2520674"/>
-            <a:ext cx="8363858" cy="2185214"/>
+            <a:ext cx="8363858" cy="1785104"/>
           </a:xfrm>
           <a:prstGeom prst="rect">
             <a:avLst/>
@@ -10090,23 +10344,27 @@
                 <a:latin typeface="Helvetica Neue Light"/>
                 <a:ea typeface="ヒラギノ明朝 ProN W3" pitchFamily="-84" charset="-128"/>
               </a:rPr>
-              <a:t>Richardson Maturity Model</a:t>
-            </a:r>
-          </a:p>
-          <a:p>
-            <a:pPr marL="342900" indent="-342900">
-              <a:buAutoNum type="arabicPeriod"/>
-            </a:pPr>
-            <a:r>
-              <a:rPr lang="en-US" sz="2600" b="1" dirty="0">
-                <a:solidFill>
-                  <a:srgbClr val="424D43"/>
+              <a:t>Richardson Maturity </a:t>
+            </a:r>
+            <a:r>
+              <a:rPr lang="en-US" sz="2600" b="1" dirty="0" smtClean="0">
+                <a:solidFill>
+                  <a:schemeClr val="bg1">
+                    <a:lumMod val="75000"/>
+                  </a:schemeClr>
                 </a:solidFill>
                 <a:latin typeface="Helvetica Neue Light"/>
                 <a:ea typeface="ヒラギノ明朝 ProN W3" pitchFamily="-84" charset="-128"/>
               </a:rPr>
-              <a:t>Developing a REST application</a:t>
-            </a:r>
+              <a:t>Model</a:t>
+            </a:r>
+            <a:endParaRPr lang="en-US" sz="2600" b="1" dirty="0">
+              <a:solidFill>
+                <a:srgbClr val="424D43"/>
+              </a:solidFill>
+              <a:latin typeface="Helvetica Neue Light"/>
+              <a:ea typeface="ヒラギノ明朝 ProN W3" pitchFamily="-84" charset="-128"/>
+            </a:endParaRPr>
           </a:p>
           <a:p>
             <a:pPr marL="342900" indent="-342900">
@@ -10140,7 +10398,7 @@
           <p:nvPr/>
         </p:nvPicPr>
         <p:blipFill>
-          <a:blip r:embed="rId2">
+          <a:blip r:embed="rId3">
             <a:extLst>
               <a:ext uri="{28A0092B-C50C-407E-A947-70E740481C1C}">
                 <a14:useLocalDpi xmlns:a14="http://schemas.microsoft.com/office/drawing/2010/main"/>
@@ -10369,7 +10627,7 @@
         <p:spPr>
           <a:xfrm>
             <a:off x="478971" y="2520674"/>
-            <a:ext cx="8363858" cy="2185214"/>
+            <a:ext cx="8363858" cy="1538883"/>
           </a:xfrm>
           <a:prstGeom prst="rect">
             <a:avLst/>
@@ -10422,13 +10680,8 @@
                 <a:latin typeface="Helvetica Neue Light"/>
                 <a:ea typeface="ヒラギノ明朝 ProN W3" pitchFamily="-84" charset="-128"/>
               </a:rPr>
-              <a:t>Richardson Maturity Model</a:t>
-            </a:r>
-          </a:p>
-          <a:p>
-            <a:pPr marL="342900" indent="-342900">
-              <a:buAutoNum type="arabicPeriod"/>
-            </a:pPr>
+              <a:t>Richardson Maturity </a:t>
+            </a:r>
             <a:r>
               <a:rPr lang="en-US" sz="2600" b="1" dirty="0" smtClean="0">
                 <a:solidFill>
@@ -10437,13 +10690,8 @@
                 <a:latin typeface="Helvetica Neue Light"/>
                 <a:ea typeface="ヒラギノ明朝 ProN W3" pitchFamily="-84" charset="-128"/>
               </a:rPr>
-              <a:t>Developing a REST application</a:t>
-            </a:r>
-          </a:p>
-          <a:p>
-            <a:pPr marL="342900" indent="-342900">
-              <a:buAutoNum type="arabicPeriod"/>
-            </a:pPr>
+              <a:t>Model</a:t>
+            </a:r>
             <a:endParaRPr lang="en-US" sz="1600" b="1" dirty="0">
               <a:solidFill>
                 <a:srgbClr val="424D43"/>
@@ -10582,7 +10830,7 @@
         <p:spPr>
           <a:xfrm>
             <a:off x="478971" y="2520674"/>
-            <a:ext cx="8363858" cy="2185214"/>
+            <a:ext cx="8363858" cy="1538883"/>
           </a:xfrm>
           <a:prstGeom prst="rect">
             <a:avLst/>
@@ -10639,13 +10887,8 @@
                 <a:latin typeface="Helvetica Neue Light"/>
                 <a:ea typeface="ヒラギノ明朝 ProN W3" pitchFamily="-84" charset="-128"/>
               </a:rPr>
-              <a:t>Richardson Maturity Model</a:t>
-            </a:r>
-          </a:p>
-          <a:p>
-            <a:pPr marL="342900" indent="-342900">
-              <a:buAutoNum type="arabicPeriod"/>
-            </a:pPr>
+              <a:t>Richardson Maturity </a:t>
+            </a:r>
             <a:r>
               <a:rPr lang="en-US" sz="2600" b="1" dirty="0" smtClean="0">
                 <a:solidFill>
@@ -10656,13 +10899,8 @@
                 <a:latin typeface="Helvetica Neue Light"/>
                 <a:ea typeface="ヒラギノ明朝 ProN W3" pitchFamily="-84" charset="-128"/>
               </a:rPr>
-              <a:t>Developing a REST application</a:t>
-            </a:r>
-          </a:p>
-          <a:p>
-            <a:pPr marL="342900" indent="-342900">
-              <a:buAutoNum type="arabicPeriod"/>
-            </a:pPr>
+              <a:t>Model</a:t>
+            </a:r>
             <a:endParaRPr lang="en-US" sz="1600" b="1" dirty="0">
               <a:solidFill>
                 <a:srgbClr val="424D43"/>
@@ -11057,7 +11295,7 @@
         <p:spPr>
           <a:xfrm>
             <a:off x="478971" y="2520674"/>
-            <a:ext cx="8363858" cy="2185214"/>
+            <a:ext cx="8363858" cy="1292662"/>
           </a:xfrm>
           <a:prstGeom prst="rect">
             <a:avLst/>
@@ -11114,13 +11352,8 @@
                 <a:latin typeface="Helvetica Neue Light"/>
                 <a:ea typeface="ヒラギノ明朝 ProN W3" pitchFamily="-84" charset="-128"/>
               </a:rPr>
-              <a:t>Richardson Maturity Model</a:t>
-            </a:r>
-          </a:p>
-          <a:p>
-            <a:pPr marL="342900" indent="-342900">
-              <a:buAutoNum type="arabicPeriod"/>
-            </a:pPr>
+              <a:t>Richardson Maturity </a:t>
+            </a:r>
             <a:r>
               <a:rPr lang="en-US" sz="2600" b="1" dirty="0" smtClean="0">
                 <a:solidFill>
@@ -11131,25 +11364,13 @@
                 <a:latin typeface="Helvetica Neue Light"/>
                 <a:ea typeface="ヒラギノ明朝 ProN W3" pitchFamily="-84" charset="-128"/>
               </a:rPr>
-              <a:t>Developing a REST application</a:t>
-            </a:r>
-          </a:p>
-          <a:p>
-            <a:pPr marL="342900" indent="-342900">
-              <a:buAutoNum type="arabicPeriod"/>
-            </a:pPr>
-            <a:endParaRPr lang="en-US" sz="1600" b="1" dirty="0">
+              <a:t>Model</a:t>
+            </a:r>
+            <a:endParaRPr lang="en-US" sz="2600" b="1" dirty="0" smtClean="0">
               <a:solidFill>
-                <a:srgbClr val="424D43"/>
-              </a:solidFill>
-              <a:latin typeface="Helvetica Neue Light"/>
-              <a:ea typeface="ヒラギノ明朝 ProN W3" pitchFamily="-84" charset="-128"/>
-            </a:endParaRPr>
-          </a:p>
-          <a:p>
-            <a:endParaRPr lang="en-US" sz="1600" dirty="0">
-              <a:solidFill>
-                <a:srgbClr val="424D43"/>
+                <a:schemeClr val="bg1">
+                  <a:lumMod val="75000"/>
+                </a:schemeClr>
               </a:solidFill>
               <a:latin typeface="Helvetica Neue Light"/>
               <a:ea typeface="ヒラギノ明朝 ProN W3" pitchFamily="-84" charset="-128"/>
@@ -11501,7 +11722,7 @@
         <p:spPr>
           <a:xfrm>
             <a:off x="318685" y="1641238"/>
-            <a:ext cx="7846747" cy="4759561"/>
+            <a:ext cx="8515214" cy="4759561"/>
           </a:xfrm>
         </p:spPr>
         <p:txBody>
@@ -15066,6 +15287,15 @@
 </file>
 
 <file path=customXml/item1.xml><?xml version="1.0" encoding="utf-8"?>
+<?mso-contentType ?>
+<FormTemplates xmlns="http://schemas.microsoft.com/sharepoint/v3/contenttype/forms">
+  <Display>DocumentLibraryForm</Display>
+  <Edit>DocumentLibraryForm</Edit>
+  <New>DocumentLibraryForm</New>
+</FormTemplates>
+</file>
+
+<file path=customXml/item2.xml><?xml version="1.0" encoding="utf-8"?>
 <p:properties xmlns:p="http://schemas.microsoft.com/office/2006/metadata/properties" xmlns:xsi="http://www.w3.org/2001/XMLSchema-instance" xmlns:pc="http://schemas.microsoft.com/office/infopath/2007/PartnerControls">
   <documentManagement>
     <TemplateUrl xmlns="http://schemas.microsoft.com/sharepoint/v3" xsi:nil="true"/>
@@ -15084,66 +15314,7 @@
 </p:properties>
 </file>
 
-<file path=customXml/item2.xml><?xml version="1.0" encoding="utf-8"?>
-<?mso-contentType ?>
-<FormTemplates xmlns="http://schemas.microsoft.com/sharepoint/v3/contenttype/forms">
-  <Display>DocumentLibraryForm</Display>
-  <Edit>DocumentLibraryForm</Edit>
-  <New>DocumentLibraryForm</New>
-</FormTemplates>
-</file>
-
 <file path=customXml/item3.xml><?xml version="1.0" encoding="utf-8"?>
-<?mso-contentType ?>
-<spe:Receivers xmlns:spe="http://schemas.microsoft.com/sharepoint/events">
-  <Receiver>
-    <Name>Document ID Generator</Name>
-    <Synchronization>Synchronous</Synchronization>
-    <Type>10001</Type>
-    <SequenceNumber>1000</SequenceNumber>
-    <Url/>
-    <Assembly>Microsoft.Office.DocumentManagement, Version=15.0.0.0, Culture=neutral, PublicKeyToken=71e9bce111e9429c</Assembly>
-    <Class>Microsoft.Office.DocumentManagement.Internal.DocIdHandler</Class>
-    <Data/>
-    <Filter/>
-  </Receiver>
-  <Receiver>
-    <Name>Document ID Generator</Name>
-    <Synchronization>Synchronous</Synchronization>
-    <Type>10002</Type>
-    <SequenceNumber>1001</SequenceNumber>
-    <Url/>
-    <Assembly>Microsoft.Office.DocumentManagement, Version=15.0.0.0, Culture=neutral, PublicKeyToken=71e9bce111e9429c</Assembly>
-    <Class>Microsoft.Office.DocumentManagement.Internal.DocIdHandler</Class>
-    <Data/>
-    <Filter/>
-  </Receiver>
-  <Receiver>
-    <Name>Document ID Generator</Name>
-    <Synchronization>Synchronous</Synchronization>
-    <Type>10004</Type>
-    <SequenceNumber>1002</SequenceNumber>
-    <Url/>
-    <Assembly>Microsoft.Office.DocumentManagement, Version=15.0.0.0, Culture=neutral, PublicKeyToken=71e9bce111e9429c</Assembly>
-    <Class>Microsoft.Office.DocumentManagement.Internal.DocIdHandler</Class>
-    <Data/>
-    <Filter/>
-  </Receiver>
-  <Receiver>
-    <Name>Document ID Generator</Name>
-    <Synchronization>Synchronous</Synchronization>
-    <Type>10006</Type>
-    <SequenceNumber>1003</SequenceNumber>
-    <Url/>
-    <Assembly>Microsoft.Office.DocumentManagement, Version=15.0.0.0, Culture=neutral, PublicKeyToken=71e9bce111e9429c</Assembly>
-    <Class>Microsoft.Office.DocumentManagement.Internal.DocIdHandler</Class>
-    <Data/>
-    <Filter/>
-  </Receiver>
-</spe:Receivers>
-</file>
-
-<file path=customXml/item4.xml><?xml version="1.0" encoding="utf-8"?>
 <ct:contentTypeSchema xmlns:ct="http://schemas.microsoft.com/office/2006/metadata/contentType" xmlns:ma="http://schemas.microsoft.com/office/2006/metadata/properties/metaAttributes" ct:_="" ma:_="" ma:contentTypeName="Document" ma:contentTypeID="0x010100E25DA1609B7607469C1AC9B6F8A6FE9D" ma:contentTypeVersion="2" ma:contentTypeDescription="Create a new document." ma:contentTypeScope="" ma:versionID="4a9137d238132a7f3847ed896ce73801">
   <xsd:schema xmlns:xsd="http://www.w3.org/2001/XMLSchema" xmlns:xs="http://www.w3.org/2001/XMLSchema" xmlns:p="http://schemas.microsoft.com/office/2006/metadata/properties" xmlns:ns1="http://schemas.microsoft.com/sharepoint/v3" xmlns:ns2="696890a7-2738-473a-8580-15948eca3069" targetNamespace="http://schemas.microsoft.com/office/2006/metadata/properties" ma:root="true" ma:fieldsID="cc6804599cb381d96cddd0f9a4d92b86" ns1:_="" ns2:_="">
     <xsd:import namespace="http://schemas.microsoft.com/sharepoint/v3"/>
@@ -15635,7 +15806,65 @@
 </ct:contentTypeSchema>
 </file>
 
+<file path=customXml/item4.xml><?xml version="1.0" encoding="utf-8"?>
+<?mso-contentType ?>
+<spe:Receivers xmlns:spe="http://schemas.microsoft.com/sharepoint/events">
+  <Receiver>
+    <Name>Document ID Generator</Name>
+    <Synchronization>Synchronous</Synchronization>
+    <Type>10001</Type>
+    <SequenceNumber>1000</SequenceNumber>
+    <Url/>
+    <Assembly>Microsoft.Office.DocumentManagement, Version=15.0.0.0, Culture=neutral, PublicKeyToken=71e9bce111e9429c</Assembly>
+    <Class>Microsoft.Office.DocumentManagement.Internal.DocIdHandler</Class>
+    <Data/>
+    <Filter/>
+  </Receiver>
+  <Receiver>
+    <Name>Document ID Generator</Name>
+    <Synchronization>Synchronous</Synchronization>
+    <Type>10002</Type>
+    <SequenceNumber>1001</SequenceNumber>
+    <Url/>
+    <Assembly>Microsoft.Office.DocumentManagement, Version=15.0.0.0, Culture=neutral, PublicKeyToken=71e9bce111e9429c</Assembly>
+    <Class>Microsoft.Office.DocumentManagement.Internal.DocIdHandler</Class>
+    <Data/>
+    <Filter/>
+  </Receiver>
+  <Receiver>
+    <Name>Document ID Generator</Name>
+    <Synchronization>Synchronous</Synchronization>
+    <Type>10004</Type>
+    <SequenceNumber>1002</SequenceNumber>
+    <Url/>
+    <Assembly>Microsoft.Office.DocumentManagement, Version=15.0.0.0, Culture=neutral, PublicKeyToken=71e9bce111e9429c</Assembly>
+    <Class>Microsoft.Office.DocumentManagement.Internal.DocIdHandler</Class>
+    <Data/>
+    <Filter/>
+  </Receiver>
+  <Receiver>
+    <Name>Document ID Generator</Name>
+    <Synchronization>Synchronous</Synchronization>
+    <Type>10006</Type>
+    <SequenceNumber>1003</SequenceNumber>
+    <Url/>
+    <Assembly>Microsoft.Office.DocumentManagement, Version=15.0.0.0, Culture=neutral, PublicKeyToken=71e9bce111e9429c</Assembly>
+    <Class>Microsoft.Office.DocumentManagement.Internal.DocIdHandler</Class>
+    <Data/>
+    <Filter/>
+  </Receiver>
+</spe:Receivers>
+</file>
+
 <file path=customXml/itemProps1.xml><?xml version="1.0" encoding="utf-8"?>
+<ds:datastoreItem xmlns:ds="http://schemas.openxmlformats.org/officeDocument/2006/customXml" ds:itemID="{EBB62213-8F90-4EF1-A6A4-641F0452CB52}">
+  <ds:schemaRefs>
+    <ds:schemaRef ds:uri="http://schemas.microsoft.com/sharepoint/v3/contenttype/forms"/>
+  </ds:schemaRefs>
+</ds:datastoreItem>
+</file>
+
+<file path=customXml/itemProps2.xml><?xml version="1.0" encoding="utf-8"?>
 <ds:datastoreItem xmlns:ds="http://schemas.openxmlformats.org/officeDocument/2006/customXml" ds:itemID="{61631425-235C-4781-93DD-7928AF7173EF}">
   <ds:schemaRefs>
     <ds:schemaRef ds:uri="http://schemas.microsoft.com/office/2006/metadata/properties"/>
@@ -15652,23 +15881,7 @@
 </ds:datastoreItem>
 </file>
 
-<file path=customXml/itemProps2.xml><?xml version="1.0" encoding="utf-8"?>
-<ds:datastoreItem xmlns:ds="http://schemas.openxmlformats.org/officeDocument/2006/customXml" ds:itemID="{EBB62213-8F90-4EF1-A6A4-641F0452CB52}">
-  <ds:schemaRefs>
-    <ds:schemaRef ds:uri="http://schemas.microsoft.com/sharepoint/v3/contenttype/forms"/>
-  </ds:schemaRefs>
-</ds:datastoreItem>
-</file>
-
 <file path=customXml/itemProps3.xml><?xml version="1.0" encoding="utf-8"?>
-<ds:datastoreItem xmlns:ds="http://schemas.openxmlformats.org/officeDocument/2006/customXml" ds:itemID="{DFBE2CE3-A764-49E9-945D-1AE464F7016A}">
-  <ds:schemaRefs>
-    <ds:schemaRef ds:uri="http://schemas.microsoft.com/sharepoint/events"/>
-  </ds:schemaRefs>
-</ds:datastoreItem>
-</file>
-
-<file path=customXml/itemProps4.xml><?xml version="1.0" encoding="utf-8"?>
 <ds:datastoreItem xmlns:ds="http://schemas.openxmlformats.org/officeDocument/2006/customXml" ds:itemID="{9537DA68-33FD-40D7-963A-955D4E055832}">
   <ds:schemaRefs>
     <ds:schemaRef ds:uri="http://schemas.microsoft.com/office/2006/metadata/contentType"/>
@@ -15685,4 +15898,12 @@
     <ds:schemaRef ds:uri="http://schemas.microsoft.com/internal/obd"/>
   </ds:schemaRefs>
 </ds:datastoreItem>
+</file>
+
+<file path=customXml/itemProps4.xml><?xml version="1.0" encoding="utf-8"?>
+<ds:datastoreItem xmlns:ds="http://schemas.openxmlformats.org/officeDocument/2006/customXml" ds:itemID="{DFBE2CE3-A764-49E9-945D-1AE464F7016A}">
+  <ds:schemaRefs>
+    <ds:schemaRef ds:uri="http://schemas.microsoft.com/sharepoint/events"/>
+  </ds:schemaRefs>
+</ds:datastoreItem>
 </file>
</xml_diff>